<commit_message>
Change in lecture 01
</commit_message>
<xml_diff>
--- a/01-Version-Control-Systems.pptx
+++ b/01-Version-Control-Systems.pptx
@@ -3951,6 +3951,13 @@
   <p:clrMapOvr>
     <a:masterClrMapping/>
   </p:clrMapOvr>
+  <p:timing>
+    <p:tnLst>
+      <p:par>
+        <p:cTn id="1" dur="indefinite" restart="never" nodeType="tmRoot"/>
+      </p:par>
+    </p:tnLst>
+  </p:timing>
 </p:sld>
 </file>
 
@@ -4560,12 +4567,14 @@
         </p:nvSpPr>
         <p:spPr>
           <a:xfrm>
-            <a:off x="762000" y="1676400"/>
-            <a:ext cx="7620000" cy="4525963"/>
+            <a:off x="457200" y="1676400"/>
+            <a:ext cx="8229600" cy="4525963"/>
           </a:xfrm>
         </p:spPr>
         <p:txBody>
-          <a:bodyPr/>
+          <a:bodyPr>
+            <a:normAutofit/>
+          </a:bodyPr>
           <a:lstStyle/>
           <a:p>
             <a:pPr>
@@ -4630,13 +4639,65 @@
                   </a:schemeClr>
                 </a:solidFill>
               </a:rPr>
-              <a:t>GIT repository</a:t>
-            </a:r>
-            <a:endParaRPr lang="bg-BG" dirty="0">
+              <a:t>GIT </a:t>
+            </a:r>
+            <a:r>
+              <a:rPr lang="en-US" dirty="0" smtClean="0">
+                <a:solidFill>
+                  <a:schemeClr val="bg1">
+                    <a:lumMod val="95000"/>
+                  </a:schemeClr>
+                </a:solidFill>
+              </a:rPr>
+              <a:t>repository</a:t>
+            </a:r>
+          </a:p>
+          <a:p>
+            <a:pPr marL="342900" lvl="1" indent="-342900">
+              <a:buFont typeface="Wingdings" panose="05000000000000000000" pitchFamily="2" charset="2"/>
+              <a:buChar char="§"/>
+            </a:pPr>
+            <a:r>
+              <a:rPr lang="en-US" sz="3200" dirty="0">
+                <a:solidFill>
+                  <a:schemeClr val="bg1"/>
+                </a:solidFill>
+              </a:rPr>
+              <a:t>Optional features to install (choose only this)</a:t>
+            </a:r>
+          </a:p>
+          <a:p>
+            <a:pPr lvl="2"/>
+            <a:r>
+              <a:rPr lang="en-US" sz="3200" dirty="0">
+                <a:solidFill>
+                  <a:schemeClr val="bg1"/>
+                </a:solidFill>
+              </a:rPr>
+              <a:t>Microsoft SQL Server Data tools</a:t>
+            </a:r>
+          </a:p>
+          <a:p>
+            <a:pPr lvl="2"/>
+            <a:r>
+              <a:rPr lang="en-US" sz="3200" dirty="0">
+                <a:solidFill>
+                  <a:schemeClr val="bg1"/>
+                </a:solidFill>
+              </a:rPr>
+              <a:t>Microsoft Web Developer </a:t>
+            </a:r>
+            <a:r>
+              <a:rPr lang="en-US" sz="3200" dirty="0" smtClean="0">
+                <a:solidFill>
+                  <a:schemeClr val="bg1"/>
+                </a:solidFill>
+              </a:rPr>
+              <a:t>tools</a:t>
+            </a:r>
+            <a:endParaRPr lang="en-US" sz="3200" dirty="0">
               <a:solidFill>
-                <a:schemeClr val="bg1">
-                  <a:lumMod val="95000"/>
-                </a:schemeClr>
+                <a:schemeClr val="bg1"/>
               </a:solidFill>
             </a:endParaRPr>
           </a:p>

</xml_diff>